<commit_message>
atualiza diagrama de caso de uso e slide
</commit_message>
<xml_diff>
--- a/Apresentacao.pptx
+++ b/Apresentacao.pptx
@@ -135,6 +135,7 @@
   <p1510:revLst>
     <p1510:client id="{83112CD6-5B9D-C409-AE09-BEF41EE9AC3F}" v="98" dt="2024-04-24T01:31:36.448"/>
     <p1510:client id="{951E94C4-7853-5508-1AB6-B81E93465317}" v="472" dt="2024-04-24T01:23:54.657"/>
+    <p1510:client id="{B01CC7F2-18C4-D765-FED5-17A65CD6F80B}" v="13" dt="2024-04-24T15:11:03.992"/>
   </p1510:revLst>
 </p1510:revInfo>
 </file>
@@ -233,7 +234,7 @@
           <a:p>
             <a:fld id="{2581520D-BC9A-4B6C-9DDD-705A8C99DD3C}" type="datetimeFigureOut">
               <a:rPr lang="pt-BR" smtClean="0"/>
-              <a:t>23/04/2024</a:t>
+              <a:t>24/04/2024</a:t>
             </a:fld>
             <a:endParaRPr lang="pt-BR"/>
           </a:p>
@@ -411,7 +412,7 @@
           <a:p>
             <a:fld id="{22571BA1-2B4E-46BF-BD13-53D93C89A72F}" type="datetimeFigureOut">
               <a:rPr lang="pt-BR" noProof="0" smtClean="0"/>
-              <a:t>23/04/2024</a:t>
+              <a:t>24/04/2024</a:t>
             </a:fld>
             <a:endParaRPr lang="pt-BR" noProof="0"/>
           </a:p>
@@ -987,7 +988,7 @@
             <a:pPr rtl="0"/>
             <a:fld id="{10624919-4C34-4119-A05F-8BFC584E5F5E}" type="datetime1">
               <a:rPr lang="pt-BR" noProof="0" smtClean="0"/>
-              <a:t>23/04/2024</a:t>
+              <a:t>24/04/2024</a:t>
             </a:fld>
             <a:endParaRPr lang="pt-BR" noProof="0"/>
           </a:p>
@@ -1195,7 +1196,7 @@
             <a:pPr rtl="0"/>
             <a:fld id="{FB787A56-9751-4121-9D1C-726A6C282FF9}" type="datetime1">
               <a:rPr lang="pt-BR" noProof="0" smtClean="0"/>
-              <a:t>23/04/2024</a:t>
+              <a:t>24/04/2024</a:t>
             </a:fld>
             <a:endParaRPr lang="pt-BR" noProof="0"/>
           </a:p>
@@ -1407,7 +1408,7 @@
             <a:pPr rtl="0"/>
             <a:fld id="{58042DDC-7971-43C4-BC81-E859C0125F14}" type="datetime1">
               <a:rPr lang="pt-BR" noProof="0" smtClean="0"/>
-              <a:t>23/04/2024</a:t>
+              <a:t>24/04/2024</a:t>
             </a:fld>
             <a:endParaRPr lang="pt-BR" noProof="0"/>
           </a:p>
@@ -1605,7 +1606,7 @@
             <a:pPr rtl="0"/>
             <a:fld id="{ABEE2F5A-1745-4488-9F87-DF4EC4A83617}" type="datetime1">
               <a:rPr lang="pt-BR" noProof="0" smtClean="0"/>
-              <a:t>23/04/2024</a:t>
+              <a:t>24/04/2024</a:t>
             </a:fld>
             <a:endParaRPr lang="pt-BR" noProof="0"/>
           </a:p>
@@ -1882,7 +1883,7 @@
             <a:pPr rtl="0"/>
             <a:fld id="{CF31E744-D47E-40BB-AD73-C92F9FE48BFF}" type="datetime1">
               <a:rPr lang="pt-BR" noProof="0" smtClean="0"/>
-              <a:t>23/04/2024</a:t>
+              <a:t>24/04/2024</a:t>
             </a:fld>
             <a:endParaRPr lang="pt-BR" noProof="0"/>
           </a:p>
@@ -2146,7 +2147,7 @@
             <a:pPr rtl="0"/>
             <a:fld id="{0E16F1EC-6FFB-4D5C-9C23-2E3413C6CBF2}" type="datetime1">
               <a:rPr lang="pt-BR" noProof="0" smtClean="0"/>
-              <a:t>23/04/2024</a:t>
+              <a:t>24/04/2024</a:t>
             </a:fld>
             <a:endParaRPr lang="pt-BR" noProof="0"/>
           </a:p>
@@ -2558,7 +2559,7 @@
             <a:pPr rtl="0"/>
             <a:fld id="{8BD20E23-6EE4-49F7-B32D-5B7B5E21B84F}" type="datetime1">
               <a:rPr lang="pt-BR" noProof="0" smtClean="0"/>
-              <a:t>23/04/2024</a:t>
+              <a:t>24/04/2024</a:t>
             </a:fld>
             <a:endParaRPr lang="pt-BR" noProof="0"/>
           </a:p>
@@ -2705,7 +2706,7 @@
             <a:pPr rtl="0"/>
             <a:fld id="{7F8B8485-02B3-497A-A58B-E858C6BB4792}" type="datetime1">
               <a:rPr lang="pt-BR" noProof="0" smtClean="0"/>
-              <a:t>23/04/2024</a:t>
+              <a:t>24/04/2024</a:t>
             </a:fld>
             <a:endParaRPr lang="pt-BR" noProof="0"/>
           </a:p>
@@ -2829,7 +2830,7 @@
             <a:pPr rtl="0"/>
             <a:fld id="{276AA06B-93AD-480C-8A93-51E94ECE37ED}" type="datetime1">
               <a:rPr lang="pt-BR" noProof="0" smtClean="0"/>
-              <a:t>23/04/2024</a:t>
+              <a:t>24/04/2024</a:t>
             </a:fld>
             <a:endParaRPr lang="pt-BR" noProof="0"/>
           </a:p>
@@ -3077,7 +3078,7 @@
             <a:pPr rtl="0"/>
             <a:fld id="{C66CF29A-83A2-454C-8E99-488A078D65D5}" type="datetime1">
               <a:rPr lang="pt-BR" noProof="0" smtClean="0"/>
-              <a:t>23/04/2024</a:t>
+              <a:t>24/04/2024</a:t>
             </a:fld>
             <a:endParaRPr lang="pt-BR" noProof="0"/>
           </a:p>
@@ -3520,7 +3521,7 @@
             <a:pPr rtl="0"/>
             <a:fld id="{A9C9F688-EBA5-4CC9-BCB9-A9F4408BC60E}" type="datetime1">
               <a:rPr lang="pt-BR" noProof="0" smtClean="0"/>
-              <a:t>23/04/2024</a:t>
+              <a:t>24/04/2024</a:t>
             </a:fld>
             <a:endParaRPr lang="pt-BR" noProof="0"/>
           </a:p>
@@ -3844,7 +3845,7 @@
             <a:pPr rtl="0"/>
             <a:fld id="{1A15393A-0B41-4699-82CD-A3438F3C08A4}" type="datetime1">
               <a:rPr lang="pt-BR" noProof="0" smtClean="0"/>
-              <a:t>23/04/2024</a:t>
+              <a:t>24/04/2024</a:t>
             </a:fld>
             <a:endParaRPr lang="pt-BR" noProof="0"/>
           </a:p>
@@ -5019,36 +5020,6 @@
       </p:sp>
       <p:pic>
         <p:nvPicPr>
-          <p:cNvPr id="4" name="Imagem 3" descr="Diagrama&#10;&#10;Descrição gerada automaticamente">
-            <a:extLst>
-              <a:ext uri="{FF2B5EF4-FFF2-40B4-BE49-F238E27FC236}">
-                <a16:creationId xmlns:a16="http://schemas.microsoft.com/office/drawing/2014/main" id="{5605165C-43FE-71B5-A2A0-0C8F0DFE1935}"/>
-              </a:ext>
-            </a:extLst>
-          </p:cNvPr>
-          <p:cNvPicPr>
-            <a:picLocks noChangeAspect="1"/>
-          </p:cNvPicPr>
-          <p:nvPr/>
-        </p:nvPicPr>
-        <p:blipFill>
-          <a:blip r:embed="rId3"/>
-          <a:stretch>
-            <a:fillRect/>
-          </a:stretch>
-        </p:blipFill>
-        <p:spPr>
-          <a:xfrm>
-            <a:off x="5451671" y="1116345"/>
-            <a:ext cx="4616325" cy="3866172"/>
-          </a:xfrm>
-          <a:prstGeom prst="rect">
-            <a:avLst/>
-          </a:prstGeom>
-        </p:spPr>
-      </p:pic>
-      <p:pic>
-        <p:nvPicPr>
           <p:cNvPr id="21" name="Picture 20">
             <a:extLst>
               <a:ext uri="{FF2B5EF4-FFF2-40B4-BE49-F238E27FC236}">
@@ -5071,7 +5042,7 @@
           </p:nvPr>
         </p:nvPicPr>
         <p:blipFill rotWithShape="1">
-          <a:blip r:embed="rId4">
+          <a:blip r:embed="rId3">
             <a:extLst>
               <a:ext uri="{28A0092B-C50C-407E-A947-70E740481C1C}">
                 <a14:useLocalDpi xmlns:a14="http://schemas.microsoft.com/office/drawing/2010/main" val="0"/>
@@ -5145,6 +5116,36 @@
           </a:fontRef>
         </p:style>
       </p:cxnSp>
+      <p:pic>
+        <p:nvPicPr>
+          <p:cNvPr id="3" name="Imagem 2" descr="Diagrama&#10;&#10;Descrição gerada automaticamente">
+            <a:extLst>
+              <a:ext uri="{FF2B5EF4-FFF2-40B4-BE49-F238E27FC236}">
+                <a16:creationId xmlns:a16="http://schemas.microsoft.com/office/drawing/2014/main" id="{26D0D002-948F-2D48-29D1-9420C14DE8C6}"/>
+              </a:ext>
+            </a:extLst>
+          </p:cNvPr>
+          <p:cNvPicPr>
+            <a:picLocks noChangeAspect="1"/>
+          </p:cNvPicPr>
+          <p:nvPr/>
+        </p:nvPicPr>
+        <p:blipFill>
+          <a:blip r:embed="rId4"/>
+          <a:stretch>
+            <a:fillRect/>
+          </a:stretch>
+        </p:blipFill>
+        <p:spPr>
+          <a:xfrm>
+            <a:off x="4699455" y="990978"/>
+            <a:ext cx="6143473" cy="4126140"/>
+          </a:xfrm>
+          <a:prstGeom prst="rect">
+            <a:avLst/>
+          </a:prstGeom>
+        </p:spPr>
+      </p:pic>
     </p:spTree>
     <p:extLst>
       <p:ext uri="{BB962C8B-B14F-4D97-AF65-F5344CB8AC3E}">

</xml_diff>